<commit_message>
Update AES Project Presentation.pptx
</commit_message>
<xml_diff>
--- a/AES Project Presentation.pptx
+++ b/AES Project Presentation.pptx
@@ -26,8 +26,10 @@
     <p:sldId id="270" r:id="rId20"/>
     <p:sldId id="272" r:id="rId21"/>
     <p:sldId id="271" r:id="rId22"/>
-    <p:sldId id="273" r:id="rId23"/>
-    <p:sldId id="274" r:id="rId24"/>
+    <p:sldId id="277" r:id="rId23"/>
+    <p:sldId id="276" r:id="rId24"/>
+    <p:sldId id="273" r:id="rId25"/>
+    <p:sldId id="274" r:id="rId26"/>
   </p:sldIdLst>
   <p:sldSz cx="9144000" cy="5143500" type="screen16x9"/>
   <p:notesSz cx="6858000" cy="9144000"/>
@@ -9663,7 +9665,7 @@
         <p:circle/>
       </p:transition>
     </mc:Choice>
-    <mc:Fallback xmlns="" xmlns:p15="http://schemas.microsoft.com/office/powerpoint/2012/main">
+    <mc:Fallback xmlns:p15="http://schemas.microsoft.com/office/powerpoint/2012/main" xmlns="">
       <p:transition spd="med">
         <p:circle/>
       </p:transition>
@@ -10266,7 +10268,7 @@
         <p:circle/>
       </p:transition>
     </mc:Choice>
-    <mc:Fallback xmlns="" xmlns:p15="http://schemas.microsoft.com/office/powerpoint/2012/main">
+    <mc:Fallback xmlns:p15="http://schemas.microsoft.com/office/powerpoint/2012/main" xmlns="">
       <p:transition spd="med">
         <p:circle/>
       </p:transition>
@@ -10765,7 +10767,7 @@
         <p:circle/>
       </p:transition>
     </mc:Choice>
-    <mc:Fallback xmlns="" xmlns:p15="http://schemas.microsoft.com/office/powerpoint/2012/main">
+    <mc:Fallback xmlns:p15="http://schemas.microsoft.com/office/powerpoint/2012/main" xmlns="">
       <p:transition spd="med">
         <p:circle/>
       </p:transition>
@@ -11280,7 +11282,7 @@
         <p:circle/>
       </p:transition>
     </mc:Choice>
-    <mc:Fallback xmlns="" xmlns:p15="http://schemas.microsoft.com/office/powerpoint/2012/main">
+    <mc:Fallback xmlns:p15="http://schemas.microsoft.com/office/powerpoint/2012/main" xmlns="">
       <p:transition spd="med">
         <p:circle/>
       </p:transition>
@@ -11725,7 +11727,7 @@
         <p:circle/>
       </p:transition>
     </mc:Choice>
-    <mc:Fallback xmlns="" xmlns:p15="http://schemas.microsoft.com/office/powerpoint/2012/main">
+    <mc:Fallback xmlns:p15="http://schemas.microsoft.com/office/powerpoint/2012/main" xmlns="">
       <p:transition spd="med">
         <p:circle/>
       </p:transition>
@@ -12077,7 +12079,7 @@
         <p:circle/>
       </p:transition>
     </mc:Choice>
-    <mc:Fallback xmlns="" xmlns:p15="http://schemas.microsoft.com/office/powerpoint/2012/main">
+    <mc:Fallback xmlns:p15="http://schemas.microsoft.com/office/powerpoint/2012/main" xmlns="">
       <p:transition spd="med">
         <p:circle/>
       </p:transition>
@@ -12414,7 +12416,7 @@
         <p:circle/>
       </p:transition>
     </mc:Choice>
-    <mc:Fallback xmlns="" xmlns:p15="http://schemas.microsoft.com/office/powerpoint/2012/main">
+    <mc:Fallback xmlns:p15="http://schemas.microsoft.com/office/powerpoint/2012/main" xmlns="">
       <p:transition spd="med">
         <p:circle/>
       </p:transition>
@@ -12580,7 +12582,7 @@
         <p:circle/>
       </p:transition>
     </mc:Choice>
-    <mc:Fallback xmlns="" xmlns:p15="http://schemas.microsoft.com/office/powerpoint/2012/main">
+    <mc:Fallback xmlns:p15="http://schemas.microsoft.com/office/powerpoint/2012/main" xmlns="">
       <p:transition spd="med">
         <p:circle/>
       </p:transition>
@@ -12746,7 +12748,7 @@
         <p:circle/>
       </p:transition>
     </mc:Choice>
-    <mc:Fallback xmlns="" xmlns:p15="http://schemas.microsoft.com/office/powerpoint/2012/main">
+    <mc:Fallback xmlns:p15="http://schemas.microsoft.com/office/powerpoint/2012/main" xmlns="">
       <p:transition spd="med">
         <p:circle/>
       </p:transition>
@@ -12779,39 +12781,9 @@
           <a:chExt cx="0" cy="0"/>
         </a:xfrm>
       </p:grpSpPr>
-      <p:pic>
-        <p:nvPicPr>
-          <p:cNvPr id="2" name="Picture 1"/>
-          <p:cNvPicPr>
-            <a:picLocks noChangeAspect="1"/>
-          </p:cNvPicPr>
-          <p:nvPr/>
-        </p:nvPicPr>
-        <p:blipFill>
-          <a:blip r:embed="rId2">
-            <a:extLst>
-              <a:ext uri="{28A0092B-C50C-407E-A947-70E740481C1C}">
-                <a14:useLocalDpi xmlns:a14="http://schemas.microsoft.com/office/drawing/2010/main" val="0"/>
-              </a:ext>
-            </a:extLst>
-          </a:blip>
-          <a:stretch>
-            <a:fillRect/>
-          </a:stretch>
-        </p:blipFill>
-        <p:spPr>
-          <a:xfrm>
-            <a:off x="5127824" y="907800"/>
-            <a:ext cx="3942433" cy="3942433"/>
-          </a:xfrm>
-          <a:prstGeom prst="rect">
-            <a:avLst/>
-          </a:prstGeom>
-        </p:spPr>
-      </p:pic>
-      <p:sp>
-        <p:nvSpPr>
-          <p:cNvPr id="274" name="TextShape 1"/>
+      <p:sp>
+        <p:nvSpPr>
+          <p:cNvPr id="268" name="TextShape 1"/>
           <p:cNvSpPr txBox="1"/>
           <p:nvPr/>
         </p:nvSpPr>
@@ -12847,7 +12819,7 @@
                 <a:latin typeface="Roboto Black"/>
                 <a:ea typeface="Roboto Black"/>
               </a:rPr>
-              <a:t>CONCLUSION</a:t>
+              <a:t>Experimental Results / Examples</a:t>
             </a:r>
             <a:endParaRPr lang="en-US" sz="3000" b="0" strike="noStrike" spc="-1">
               <a:solidFill>
@@ -12860,56 +12832,7 @@
       </p:sp>
       <p:sp>
         <p:nvSpPr>
-          <p:cNvPr id="275" name="TextShape 2"/>
-          <p:cNvSpPr txBox="1"/>
-          <p:nvPr/>
-        </p:nvSpPr>
-        <p:spPr>
-          <a:xfrm>
-            <a:off x="263810" y="1718698"/>
-            <a:ext cx="4853879" cy="2409480"/>
-          </a:xfrm>
-          <a:prstGeom prst="rect">
-            <a:avLst/>
-          </a:prstGeom>
-          <a:noFill/>
-          <a:ln>
-            <a:noFill/>
-          </a:ln>
-        </p:spPr>
-        <p:txBody>
-          <a:bodyPr tIns="91440" bIns="91440">
-            <a:noAutofit/>
-          </a:bodyPr>
-          <a:lstStyle/>
-          <a:p>
-            <a:pPr marL="114480" algn="just">
-              <a:lnSpc>
-                <a:spcPct val="100000"/>
-              </a:lnSpc>
-              <a:tabLst>
-                <a:tab pos="0" algn="l"/>
-              </a:tabLst>
-            </a:pPr>
-            <a:r>
-              <a:rPr lang="en-IN" sz="1600" b="0" strike="noStrike" spc="-1" dirty="0">
-                <a:solidFill>
-                  <a:srgbClr val="FFFFFF"/>
-                </a:solidFill>
-                <a:latin typeface="Roboto Light"/>
-                <a:ea typeface="Roboto Light"/>
-              </a:rPr>
-              <a:t>In this project, we have implemented AES algorithm in python and built a system to secure data for online transmission.  In our project we can encrypt text messages, images, voice messages, documents and any other types of files. And also decrypt text messages, images, voice messages, documents and any other types of files with proper keys. Without the right keys, no one can extract any information from the encrypted files. </a:t>
-            </a:r>
-            <a:endParaRPr lang="en-US" sz="1600" b="0" strike="noStrike" spc="-1" dirty="0">
-              <a:latin typeface="Arial"/>
-            </a:endParaRPr>
-          </a:p>
-        </p:txBody>
-      </p:sp>
-      <p:sp>
-        <p:nvSpPr>
-          <p:cNvPr id="276" name="CustomShape 3"/>
+          <p:cNvPr id="269" name="CustomShape 2"/>
           <p:cNvSpPr/>
           <p:nvPr/>
         </p:nvSpPr>
@@ -12956,19 +12879,54 @@
           <a:fontRef idx="minor"/>
         </p:style>
       </p:sp>
+      <p:pic>
+        <p:nvPicPr>
+          <p:cNvPr id="2" name="Picture 1"/>
+          <p:cNvPicPr>
+            <a:picLocks noChangeAspect="1"/>
+          </p:cNvPicPr>
+          <p:nvPr/>
+        </p:nvPicPr>
+        <p:blipFill>
+          <a:blip r:embed="rId2">
+            <a:extLst>
+              <a:ext uri="{28A0092B-C50C-407E-A947-70E740481C1C}">
+                <a14:useLocalDpi xmlns:a14="http://schemas.microsoft.com/office/drawing/2010/main" val="0"/>
+              </a:ext>
+            </a:extLst>
+          </a:blip>
+          <a:stretch>
+            <a:fillRect/>
+          </a:stretch>
+        </p:blipFill>
+        <p:spPr>
+          <a:xfrm>
+            <a:off x="811659" y="870068"/>
+            <a:ext cx="7541232" cy="3669466"/>
+          </a:xfrm>
+          <a:prstGeom prst="rect">
+            <a:avLst/>
+          </a:prstGeom>
+        </p:spPr>
+      </p:pic>
     </p:spTree>
+    <p:extLst>
+      <p:ext uri="{BB962C8B-B14F-4D97-AF65-F5344CB8AC3E}">
+        <p14:creationId xmlns:p14="http://schemas.microsoft.com/office/powerpoint/2010/main" val="3219748949"/>
+      </p:ext>
+    </p:extLst>
   </p:cSld>
   <p:clrMapOvr>
     <a:masterClrMapping/>
   </p:clrMapOvr>
-  <mc:AlternateContent xmlns:mc="http://schemas.openxmlformats.org/markup-compatibility/2006" xmlns:p14="http://schemas.microsoft.com/office/powerpoint/2010/main">
-    <mc:Choice Requires="p14">
+  <mc:AlternateContent xmlns:mc="http://schemas.openxmlformats.org/markup-compatibility/2006">
+    <mc:Choice xmlns:p14="http://schemas.microsoft.com/office/powerpoint/2010/main" Requires="p14">
       <p:transition spd="slow" p14:dur="800">
         <p:circle/>
       </p:transition>
     </mc:Choice>
-    <mc:Fallback xmlns="" xmlns:p15="http://schemas.microsoft.com/office/powerpoint/2012/main">
-      <p:transition spd="med">
+    <mc:Fallback>
+      <p:transition spd="slow">
         <p:circle/>
       </p:transition>
     </mc:Fallback>
@@ -15416,7 +15374,7 @@
         <p:circle/>
       </p:transition>
     </mc:Choice>
-    <mc:Fallback xmlns="" xmlns:p15="http://schemas.microsoft.com/office/powerpoint/2012/main">
+    <mc:Fallback xmlns:p15="http://schemas.microsoft.com/office/powerpoint/2012/main" xmlns="">
       <p:transition spd="med">
         <p:circle/>
       </p:transition>
@@ -15433,6 +15391,404 @@
 </file>
 
 <file path=ppt/slides/slide20.xml><?xml version="1.0" encoding="utf-8"?>
+<p:sld xmlns:a="http://schemas.openxmlformats.org/drawingml/2006/main" xmlns:r="http://schemas.openxmlformats.org/officeDocument/2006/relationships" xmlns:p="http://schemas.openxmlformats.org/presentationml/2006/main">
+  <p:cSld>
+    <p:spTree>
+      <p:nvGrpSpPr>
+        <p:cNvPr id="1" name=""/>
+        <p:cNvGrpSpPr/>
+        <p:nvPr/>
+      </p:nvGrpSpPr>
+      <p:grpSpPr>
+        <a:xfrm>
+          <a:off x="0" y="0"/>
+          <a:ext cx="0" cy="0"/>
+          <a:chOff x="0" y="0"/>
+          <a:chExt cx="0" cy="0"/>
+        </a:xfrm>
+      </p:grpSpPr>
+      <p:sp>
+        <p:nvSpPr>
+          <p:cNvPr id="268" name="TextShape 1"/>
+          <p:cNvSpPr txBox="1"/>
+          <p:nvPr/>
+        </p:nvSpPr>
+        <p:spPr>
+          <a:xfrm>
+            <a:off x="311760" y="108720"/>
+            <a:ext cx="8520120" cy="606240"/>
+          </a:xfrm>
+          <a:prstGeom prst="rect">
+            <a:avLst/>
+          </a:prstGeom>
+          <a:noFill/>
+          <a:ln>
+            <a:noFill/>
+          </a:ln>
+        </p:spPr>
+        <p:txBody>
+          <a:bodyPr tIns="91440" bIns="91440" anchor="b">
+            <a:noAutofit/>
+          </a:bodyPr>
+          <a:lstStyle/>
+          <a:p>
+            <a:pPr algn="ctr">
+              <a:lnSpc>
+                <a:spcPct val="100000"/>
+              </a:lnSpc>
+            </a:pPr>
+            <a:r>
+              <a:rPr lang="en-IN" sz="3000" b="1" strike="noStrike" spc="-1">
+                <a:solidFill>
+                  <a:srgbClr val="FFFFFF"/>
+                </a:solidFill>
+                <a:latin typeface="Roboto Black"/>
+                <a:ea typeface="Roboto Black"/>
+              </a:rPr>
+              <a:t>Experimental Results / Examples</a:t>
+            </a:r>
+            <a:endParaRPr lang="en-US" sz="3000" b="0" strike="noStrike" spc="-1">
+              <a:solidFill>
+                <a:srgbClr val="000000"/>
+              </a:solidFill>
+              <a:latin typeface="Arial"/>
+            </a:endParaRPr>
+          </a:p>
+        </p:txBody>
+      </p:sp>
+      <p:sp>
+        <p:nvSpPr>
+          <p:cNvPr id="269" name="CustomShape 2"/>
+          <p:cNvSpPr/>
+          <p:nvPr/>
+        </p:nvSpPr>
+        <p:spPr>
+          <a:xfrm>
+            <a:off x="311760" y="760320"/>
+            <a:ext cx="8520120" cy="360"/>
+          </a:xfrm>
+          <a:custGeom>
+            <a:avLst/>
+            <a:gdLst/>
+            <a:ahLst/>
+            <a:cxnLst/>
+            <a:rect l="l" t="t" r="r" b="b"/>
+            <a:pathLst>
+              <a:path w="21600" h="21600">
+                <a:moveTo>
+                  <a:pt x="0" y="0"/>
+                </a:moveTo>
+                <a:lnTo>
+                  <a:pt x="21600" y="21600"/>
+                </a:lnTo>
+              </a:path>
+            </a:pathLst>
+          </a:custGeom>
+          <a:noFill/>
+          <a:ln w="9360">
+            <a:solidFill>
+              <a:schemeClr val="accent1"/>
+            </a:solidFill>
+            <a:round/>
+          </a:ln>
+        </p:spPr>
+        <p:style>
+          <a:lnRef idx="0">
+            <a:scrgbClr r="0" g="0" b="0"/>
+          </a:lnRef>
+          <a:fillRef idx="0">
+            <a:scrgbClr r="0" g="0" b="0"/>
+          </a:fillRef>
+          <a:effectRef idx="0">
+            <a:scrgbClr r="0" g="0" b="0"/>
+          </a:effectRef>
+          <a:fontRef idx="minor"/>
+        </p:style>
+      </p:sp>
+      <p:pic>
+        <p:nvPicPr>
+          <p:cNvPr id="2" name="Picture 1"/>
+          <p:cNvPicPr>
+            <a:picLocks noChangeAspect="1"/>
+          </p:cNvPicPr>
+          <p:nvPr/>
+        </p:nvPicPr>
+        <p:blipFill>
+          <a:blip r:embed="rId2">
+            <a:extLst>
+              <a:ext uri="{28A0092B-C50C-407E-A947-70E740481C1C}">
+                <a14:useLocalDpi xmlns:a14="http://schemas.microsoft.com/office/drawing/2010/main" val="0"/>
+              </a:ext>
+            </a:extLst>
+          </a:blip>
+          <a:stretch>
+            <a:fillRect/>
+          </a:stretch>
+        </p:blipFill>
+        <p:spPr>
+          <a:xfrm>
+            <a:off x="792744" y="870668"/>
+            <a:ext cx="7582723" cy="3670510"/>
+          </a:xfrm>
+          <a:prstGeom prst="rect">
+            <a:avLst/>
+          </a:prstGeom>
+        </p:spPr>
+      </p:pic>
+    </p:spTree>
+    <p:extLst>
+      <p:ext uri="{BB962C8B-B14F-4D97-AF65-F5344CB8AC3E}">
+        <p14:creationId xmlns:p14="http://schemas.microsoft.com/office/powerpoint/2010/main" val="464809911"/>
+      </p:ext>
+    </p:extLst>
+  </p:cSld>
+  <p:clrMapOvr>
+    <a:masterClrMapping/>
+  </p:clrMapOvr>
+  <mc:AlternateContent xmlns:mc="http://schemas.openxmlformats.org/markup-compatibility/2006">
+    <mc:Choice xmlns:p14="http://schemas.microsoft.com/office/powerpoint/2010/main" Requires="p14">
+      <p:transition spd="slow" p14:dur="800">
+        <p:circle/>
+      </p:transition>
+    </mc:Choice>
+    <mc:Fallback>
+      <p:transition spd="slow">
+        <p:circle/>
+      </p:transition>
+    </mc:Fallback>
+  </mc:AlternateContent>
+  <p:timing>
+    <p:tnLst>
+      <p:par>
+        <p:cTn id="1" dur="indefinite" restart="never" nodeType="tmRoot"/>
+      </p:par>
+    </p:tnLst>
+  </p:timing>
+</p:sld>
+</file>
+
+<file path=ppt/slides/slide21.xml><?xml version="1.0" encoding="utf-8"?>
+<p:sld xmlns:a="http://schemas.openxmlformats.org/drawingml/2006/main" xmlns:r="http://schemas.openxmlformats.org/officeDocument/2006/relationships" xmlns:p="http://schemas.openxmlformats.org/presentationml/2006/main">
+  <p:cSld>
+    <p:spTree>
+      <p:nvGrpSpPr>
+        <p:cNvPr id="1" name=""/>
+        <p:cNvGrpSpPr/>
+        <p:nvPr/>
+      </p:nvGrpSpPr>
+      <p:grpSpPr>
+        <a:xfrm>
+          <a:off x="0" y="0"/>
+          <a:ext cx="0" cy="0"/>
+          <a:chOff x="0" y="0"/>
+          <a:chExt cx="0" cy="0"/>
+        </a:xfrm>
+      </p:grpSpPr>
+      <p:pic>
+        <p:nvPicPr>
+          <p:cNvPr id="2" name="Picture 1"/>
+          <p:cNvPicPr>
+            <a:picLocks noChangeAspect="1"/>
+          </p:cNvPicPr>
+          <p:nvPr/>
+        </p:nvPicPr>
+        <p:blipFill>
+          <a:blip r:embed="rId2">
+            <a:extLst>
+              <a:ext uri="{28A0092B-C50C-407E-A947-70E740481C1C}">
+                <a14:useLocalDpi xmlns:a14="http://schemas.microsoft.com/office/drawing/2010/main" val="0"/>
+              </a:ext>
+            </a:extLst>
+          </a:blip>
+          <a:stretch>
+            <a:fillRect/>
+          </a:stretch>
+        </p:blipFill>
+        <p:spPr>
+          <a:xfrm>
+            <a:off x="5127824" y="907800"/>
+            <a:ext cx="3942433" cy="3942433"/>
+          </a:xfrm>
+          <a:prstGeom prst="rect">
+            <a:avLst/>
+          </a:prstGeom>
+        </p:spPr>
+      </p:pic>
+      <p:sp>
+        <p:nvSpPr>
+          <p:cNvPr id="274" name="TextShape 1"/>
+          <p:cNvSpPr txBox="1"/>
+          <p:nvPr/>
+        </p:nvSpPr>
+        <p:spPr>
+          <a:xfrm>
+            <a:off x="311760" y="108720"/>
+            <a:ext cx="8520120" cy="606240"/>
+          </a:xfrm>
+          <a:prstGeom prst="rect">
+            <a:avLst/>
+          </a:prstGeom>
+          <a:noFill/>
+          <a:ln>
+            <a:noFill/>
+          </a:ln>
+        </p:spPr>
+        <p:txBody>
+          <a:bodyPr tIns="91440" bIns="91440" anchor="b">
+            <a:noAutofit/>
+          </a:bodyPr>
+          <a:lstStyle/>
+          <a:p>
+            <a:pPr algn="ctr">
+              <a:lnSpc>
+                <a:spcPct val="100000"/>
+              </a:lnSpc>
+            </a:pPr>
+            <a:r>
+              <a:rPr lang="en-IN" sz="3000" b="1" strike="noStrike" spc="-1">
+                <a:solidFill>
+                  <a:srgbClr val="FFFFFF"/>
+                </a:solidFill>
+                <a:latin typeface="Roboto Black"/>
+                <a:ea typeface="Roboto Black"/>
+              </a:rPr>
+              <a:t>CONCLUSION</a:t>
+            </a:r>
+            <a:endParaRPr lang="en-US" sz="3000" b="0" strike="noStrike" spc="-1">
+              <a:solidFill>
+                <a:srgbClr val="000000"/>
+              </a:solidFill>
+              <a:latin typeface="Arial"/>
+            </a:endParaRPr>
+          </a:p>
+        </p:txBody>
+      </p:sp>
+      <p:sp>
+        <p:nvSpPr>
+          <p:cNvPr id="275" name="TextShape 2"/>
+          <p:cNvSpPr txBox="1"/>
+          <p:nvPr/>
+        </p:nvSpPr>
+        <p:spPr>
+          <a:xfrm>
+            <a:off x="263810" y="1718698"/>
+            <a:ext cx="4853879" cy="2409480"/>
+          </a:xfrm>
+          <a:prstGeom prst="rect">
+            <a:avLst/>
+          </a:prstGeom>
+          <a:noFill/>
+          <a:ln>
+            <a:noFill/>
+          </a:ln>
+        </p:spPr>
+        <p:txBody>
+          <a:bodyPr tIns="91440" bIns="91440">
+            <a:noAutofit/>
+          </a:bodyPr>
+          <a:lstStyle/>
+          <a:p>
+            <a:pPr marL="114480" algn="just">
+              <a:lnSpc>
+                <a:spcPct val="100000"/>
+              </a:lnSpc>
+              <a:tabLst>
+                <a:tab pos="0" algn="l"/>
+              </a:tabLst>
+            </a:pPr>
+            <a:r>
+              <a:rPr lang="en-IN" sz="1600" b="0" strike="noStrike" spc="-1" dirty="0">
+                <a:solidFill>
+                  <a:srgbClr val="FFFFFF"/>
+                </a:solidFill>
+                <a:latin typeface="Roboto Light"/>
+                <a:ea typeface="Roboto Light"/>
+              </a:rPr>
+              <a:t>In this project, we have implemented AES algorithm in python and built a system to secure data for online transmission.  In our project we can encrypt text messages, images, voice messages, documents and any other types of files. And also decrypt text messages, images, voice messages, documents and any other types of files with proper keys. Without the right keys, no one can extract any information from the encrypted files. </a:t>
+            </a:r>
+            <a:endParaRPr lang="en-US" sz="1600" b="0" strike="noStrike" spc="-1" dirty="0">
+              <a:latin typeface="Arial"/>
+            </a:endParaRPr>
+          </a:p>
+        </p:txBody>
+      </p:sp>
+      <p:sp>
+        <p:nvSpPr>
+          <p:cNvPr id="276" name="CustomShape 3"/>
+          <p:cNvSpPr/>
+          <p:nvPr/>
+        </p:nvSpPr>
+        <p:spPr>
+          <a:xfrm>
+            <a:off x="311760" y="760320"/>
+            <a:ext cx="8520120" cy="360"/>
+          </a:xfrm>
+          <a:custGeom>
+            <a:avLst/>
+            <a:gdLst/>
+            <a:ahLst/>
+            <a:cxnLst/>
+            <a:rect l="l" t="t" r="r" b="b"/>
+            <a:pathLst>
+              <a:path w="21600" h="21600">
+                <a:moveTo>
+                  <a:pt x="0" y="0"/>
+                </a:moveTo>
+                <a:lnTo>
+                  <a:pt x="21600" y="21600"/>
+                </a:lnTo>
+              </a:path>
+            </a:pathLst>
+          </a:custGeom>
+          <a:noFill/>
+          <a:ln w="9360">
+            <a:solidFill>
+              <a:schemeClr val="accent1"/>
+            </a:solidFill>
+            <a:round/>
+          </a:ln>
+        </p:spPr>
+        <p:style>
+          <a:lnRef idx="0">
+            <a:scrgbClr r="0" g="0" b="0"/>
+          </a:lnRef>
+          <a:fillRef idx="0">
+            <a:scrgbClr r="0" g="0" b="0"/>
+          </a:fillRef>
+          <a:effectRef idx="0">
+            <a:scrgbClr r="0" g="0" b="0"/>
+          </a:effectRef>
+          <a:fontRef idx="minor"/>
+        </p:style>
+      </p:sp>
+    </p:spTree>
+  </p:cSld>
+  <p:clrMapOvr>
+    <a:masterClrMapping/>
+  </p:clrMapOvr>
+  <mc:AlternateContent xmlns:mc="http://schemas.openxmlformats.org/markup-compatibility/2006" xmlns:p14="http://schemas.microsoft.com/office/powerpoint/2010/main">
+    <mc:Choice Requires="p14">
+      <p:transition spd="slow" p14:dur="800">
+        <p:circle/>
+      </p:transition>
+    </mc:Choice>
+    <mc:Fallback xmlns:p15="http://schemas.microsoft.com/office/powerpoint/2012/main" xmlns="">
+      <p:transition spd="med">
+        <p:circle/>
+      </p:transition>
+    </mc:Fallback>
+  </mc:AlternateContent>
+  <p:timing>
+    <p:tnLst>
+      <p:par>
+        <p:cTn id="1" dur="indefinite" restart="never" nodeType="tmRoot"/>
+      </p:par>
+    </p:tnLst>
+  </p:timing>
+</p:sld>
+</file>
+
+<file path=ppt/slides/slide22.xml><?xml version="1.0" encoding="utf-8"?>
 <p:sld xmlns:a="http://schemas.openxmlformats.org/drawingml/2006/main" xmlns:r="http://schemas.openxmlformats.org/officeDocument/2006/relationships" xmlns:p="http://schemas.openxmlformats.org/presentationml/2006/main">
   <p:cSld>
     <p:spTree>
@@ -16563,7 +16919,7 @@
         <p:circle/>
       </p:transition>
     </mc:Choice>
-    <mc:Fallback xmlns="" xmlns:p15="http://schemas.microsoft.com/office/powerpoint/2012/main">
+    <mc:Fallback xmlns:p15="http://schemas.microsoft.com/office/powerpoint/2012/main" xmlns="">
       <p:transition spd="med">
         <p:circle/>
       </p:transition>
@@ -17326,7 +17682,7 @@
         <p:circle/>
       </p:transition>
     </mc:Choice>
-    <mc:Fallback xmlns="" xmlns:p15="http://schemas.microsoft.com/office/powerpoint/2012/main">
+    <mc:Fallback xmlns:p15="http://schemas.microsoft.com/office/powerpoint/2012/main" xmlns="">
       <p:transition spd="med">
         <p:circle/>
       </p:transition>
@@ -17447,39 +17803,7 @@
                   <a:schemeClr val="bg1"/>
                 </a:solidFill>
               </a:rPr>
-              <a:t>Data is a most important part of our lives. It’s the root of knowledge. But some data in wrong hand can be very dangerous for us. That’s why data security is compulsory. Sometime we need to transfer confidential data through the internet. But internet in full of hackers and eavesdropper.  In </a:t>
-            </a:r>
-            <a:r>
-              <a:rPr lang="en-IN" sz="1200" dirty="0" smtClean="0">
-                <a:solidFill>
-                  <a:schemeClr val="bg1"/>
-                </a:solidFill>
-              </a:rPr>
-              <a:t>that </a:t>
-            </a:r>
-            <a:r>
-              <a:rPr lang="en-IN" sz="1200" dirty="0" smtClean="0">
-                <a:solidFill>
-                  <a:schemeClr val="bg1"/>
-                </a:solidFill>
-              </a:rPr>
-              <a:t>case, the best way to secure data </a:t>
-            </a:r>
-            <a:r>
-              <a:rPr lang="en-IN" sz="1200" dirty="0" smtClean="0">
-                <a:solidFill>
-                  <a:schemeClr val="bg1"/>
-                </a:solidFill>
-              </a:rPr>
-              <a:t>is </a:t>
-            </a:r>
-            <a:r>
-              <a:rPr lang="en-IN" sz="1200" dirty="0" smtClean="0">
-                <a:solidFill>
-                  <a:schemeClr val="bg1"/>
-                </a:solidFill>
-              </a:rPr>
-              <a:t>Cryptography. Cryptography is the way to hide information by encryption and decoding it by decryption. The Advanced Encryption Standard (AES) algorithm, also known as the </a:t>
+              <a:t>Data is a most important part of our lives. It’s the root of knowledge. But some data in wrong hand can be very dangerous for us. That’s why data security is compulsory. Sometime we need to transfer confidential data through the internet. But internet in full of hackers and eavesdropper.  In that case, the best way to secure data is Cryptography. Cryptography is the way to hide information by encryption and decoding it by decryption. The Advanced Encryption Standard (AES) algorithm, also known as the </a:t>
             </a:r>
             <a:r>
               <a:rPr lang="en-IN" sz="1200" dirty="0" err="1" smtClean="0">
@@ -17590,7 +17914,7 @@
         <p:circle/>
       </p:transition>
     </mc:Choice>
-    <mc:Fallback xmlns="" xmlns:p15="http://schemas.microsoft.com/office/powerpoint/2012/main">
+    <mc:Fallback xmlns:p15="http://schemas.microsoft.com/office/powerpoint/2012/main" xmlns="">
       <p:transition spd="med">
         <p:circle/>
       </p:transition>
@@ -17934,7 +18258,7 @@
         <p:circle/>
       </p:transition>
     </mc:Choice>
-    <mc:Fallback xmlns="" xmlns:p15="http://schemas.microsoft.com/office/powerpoint/2012/main">
+    <mc:Fallback xmlns:p15="http://schemas.microsoft.com/office/powerpoint/2012/main" xmlns="">
       <p:transition spd="med">
         <p:circle/>
       </p:transition>
@@ -18530,7 +18854,7 @@
         <p:circle/>
       </p:transition>
     </mc:Choice>
-    <mc:Fallback xmlns="" xmlns:p15="http://schemas.microsoft.com/office/powerpoint/2012/main">
+    <mc:Fallback xmlns:p15="http://schemas.microsoft.com/office/powerpoint/2012/main" xmlns="">
       <p:transition spd="med">
         <p:circle/>
       </p:transition>
@@ -19170,7 +19494,7 @@
         <p:circle/>
       </p:transition>
     </mc:Choice>
-    <mc:Fallback xmlns="" xmlns:p15="http://schemas.microsoft.com/office/powerpoint/2012/main">
+    <mc:Fallback xmlns:p15="http://schemas.microsoft.com/office/powerpoint/2012/main" xmlns="">
       <p:transition spd="med">
         <p:circle/>
       </p:transition>
@@ -19620,7 +19944,7 @@
         <p:circle/>
       </p:transition>
     </mc:Choice>
-    <mc:Fallback xmlns="" xmlns:p15="http://schemas.microsoft.com/office/powerpoint/2012/main">
+    <mc:Fallback xmlns:p15="http://schemas.microsoft.com/office/powerpoint/2012/main" xmlns="">
       <p:transition spd="med">
         <p:circle/>
       </p:transition>
@@ -20076,7 +20400,7 @@
         <p:circle/>
       </p:transition>
     </mc:Choice>
-    <mc:Fallback xmlns="" xmlns:p15="http://schemas.microsoft.com/office/powerpoint/2012/main">
+    <mc:Fallback xmlns:p15="http://schemas.microsoft.com/office/powerpoint/2012/main" xmlns="">
       <p:transition spd="med">
         <p:circle/>
       </p:transition>

</xml_diff>